<commit_message>
slide and readme updates
</commit_message>
<xml_diff>
--- a/slides/02_python_data_science.pptx
+++ b/slides/02_python_data_science.pptx
@@ -215,7 +215,7 @@
           <a:p>
             <a:fld id="{9F7F6CBF-61EF-7C48-892D-B7429524CEDA}" type="datetimeFigureOut">
               <a:rPr lang="en-US" smtClean="0"/>
-              <a:t>8/5/18</a:t>
+              <a:t>9/4/18</a:t>
             </a:fld>
             <a:endParaRPr lang="en-US"/>
           </a:p>
@@ -629,7 +629,7 @@
           <a:p>
             <a:fld id="{AE503295-A9A3-FF46-806B-89295F7B1623}" type="datetimeFigureOut">
               <a:rPr lang="en-US" smtClean="0"/>
-              <a:t>8/5/18</a:t>
+              <a:t>9/4/18</a:t>
             </a:fld>
             <a:endParaRPr lang="en-US"/>
           </a:p>
@@ -857,7 +857,7 @@
           <a:p>
             <a:fld id="{AE503295-A9A3-FF46-806B-89295F7B1623}" type="datetimeFigureOut">
               <a:rPr lang="en-US" smtClean="0"/>
-              <a:t>8/5/18</a:t>
+              <a:t>9/4/18</a:t>
             </a:fld>
             <a:endParaRPr lang="en-US"/>
           </a:p>
@@ -1065,7 +1065,7 @@
           <a:p>
             <a:fld id="{AE503295-A9A3-FF46-806B-89295F7B1623}" type="datetimeFigureOut">
               <a:rPr lang="en-US" smtClean="0"/>
-              <a:t>8/5/18</a:t>
+              <a:t>9/4/18</a:t>
             </a:fld>
             <a:endParaRPr lang="en-US"/>
           </a:p>
@@ -1263,7 +1263,7 @@
           <a:p>
             <a:fld id="{AE503295-A9A3-FF46-806B-89295F7B1623}" type="datetimeFigureOut">
               <a:rPr lang="en-US" smtClean="0"/>
-              <a:t>8/5/18</a:t>
+              <a:t>9/4/18</a:t>
             </a:fld>
             <a:endParaRPr lang="en-US"/>
           </a:p>
@@ -1538,7 +1538,7 @@
           <a:p>
             <a:fld id="{AE503295-A9A3-FF46-806B-89295F7B1623}" type="datetimeFigureOut">
               <a:rPr lang="en-US" smtClean="0"/>
-              <a:t>8/5/18</a:t>
+              <a:t>9/4/18</a:t>
             </a:fld>
             <a:endParaRPr lang="en-US"/>
           </a:p>
@@ -1803,7 +1803,7 @@
           <a:p>
             <a:fld id="{AE503295-A9A3-FF46-806B-89295F7B1623}" type="datetimeFigureOut">
               <a:rPr lang="en-US" smtClean="0"/>
-              <a:t>8/5/18</a:t>
+              <a:t>9/4/18</a:t>
             </a:fld>
             <a:endParaRPr lang="en-US"/>
           </a:p>
@@ -2215,7 +2215,7 @@
           <a:p>
             <a:fld id="{AE503295-A9A3-FF46-806B-89295F7B1623}" type="datetimeFigureOut">
               <a:rPr lang="en-US" smtClean="0"/>
-              <a:t>8/5/18</a:t>
+              <a:t>9/4/18</a:t>
             </a:fld>
             <a:endParaRPr lang="en-US"/>
           </a:p>
@@ -2356,7 +2356,7 @@
           <a:p>
             <a:fld id="{AE503295-A9A3-FF46-806B-89295F7B1623}" type="datetimeFigureOut">
               <a:rPr lang="en-US" smtClean="0"/>
-              <a:t>8/5/18</a:t>
+              <a:t>9/4/18</a:t>
             </a:fld>
             <a:endParaRPr lang="en-US"/>
           </a:p>
@@ -2469,7 +2469,7 @@
           <a:p>
             <a:fld id="{AE503295-A9A3-FF46-806B-89295F7B1623}" type="datetimeFigureOut">
               <a:rPr lang="en-US" smtClean="0"/>
-              <a:t>8/5/18</a:t>
+              <a:t>9/4/18</a:t>
             </a:fld>
             <a:endParaRPr lang="en-US"/>
           </a:p>
@@ -2780,7 +2780,7 @@
           <a:p>
             <a:fld id="{AE503295-A9A3-FF46-806B-89295F7B1623}" type="datetimeFigureOut">
               <a:rPr lang="en-US" smtClean="0"/>
-              <a:t>8/5/18</a:t>
+              <a:t>9/4/18</a:t>
             </a:fld>
             <a:endParaRPr lang="en-US"/>
           </a:p>
@@ -3068,7 +3068,7 @@
           <a:p>
             <a:fld id="{AE503295-A9A3-FF46-806B-89295F7B1623}" type="datetimeFigureOut">
               <a:rPr lang="en-US" smtClean="0"/>
-              <a:t>8/5/18</a:t>
+              <a:t>9/4/18</a:t>
             </a:fld>
             <a:endParaRPr lang="en-US"/>
           </a:p>
@@ -3309,7 +3309,7 @@
           <a:p>
             <a:fld id="{AE503295-A9A3-FF46-806B-89295F7B1623}" type="datetimeFigureOut">
               <a:rPr lang="en-US" smtClean="0"/>
-              <a:t>8/5/18</a:t>
+              <a:t>9/4/18</a:t>
             </a:fld>
             <a:endParaRPr lang="en-US"/>
           </a:p>
@@ -5021,6 +5021,47 @@
               <a:t> notebooks.</a:t>
             </a:r>
             <a:endParaRPr lang="en-US" dirty="0"/>
+          </a:p>
+        </p:txBody>
+      </p:sp>
+      <p:sp>
+        <p:nvSpPr>
+          <p:cNvPr id="4" name="Rectangle 3">
+            <a:extLst>
+              <a:ext uri="{FF2B5EF4-FFF2-40B4-BE49-F238E27FC236}">
+                <a16:creationId xmlns:a16="http://schemas.microsoft.com/office/drawing/2014/main" id="{0D91C9EF-B6BA-AD49-B694-9AE04FB3C322}"/>
+              </a:ext>
+            </a:extLst>
+          </p:cNvPr>
+          <p:cNvSpPr/>
+          <p:nvPr/>
+        </p:nvSpPr>
+        <p:spPr>
+          <a:xfrm>
+            <a:off x="-1938054" y="6152634"/>
+            <a:ext cx="5476307" cy="369332"/>
+          </a:xfrm>
+          <a:prstGeom prst="rect">
+            <a:avLst/>
+          </a:prstGeom>
+        </p:spPr>
+        <p:txBody>
+          <a:bodyPr wrap="none">
+            <a:spAutoFit/>
+          </a:bodyPr>
+          <a:lstStyle/>
+          <a:p>
+            <a:r>
+              <a:rPr lang="en-US">
+                <a:solidFill>
+                  <a:srgbClr val="0366D6"/>
+                </a:solidFill>
+                <a:latin typeface="-apple-system"/>
+                <a:hlinkClick r:id="rId2"/>
+              </a:rPr>
+              <a:t>Python Objects, Map, Lambda, and List Comprehensions</a:t>
+            </a:r>
+            <a:endParaRPr lang="en-US"/>
           </a:p>
         </p:txBody>
       </p:sp>

</xml_diff>